<commit_message>
added groupings to presentation
</commit_message>
<xml_diff>
--- a/etc/final_presentation_v1.pptx
+++ b/etc/final_presentation_v1.pptx
@@ -8,9 +8,9 @@
     <p:sldId id="256" r:id="rId2"/>
     <p:sldId id="257" r:id="rId3"/>
     <p:sldId id="260" r:id="rId4"/>
-    <p:sldId id="258" r:id="rId5"/>
-    <p:sldId id="264" r:id="rId6"/>
-    <p:sldId id="263" r:id="rId7"/>
+    <p:sldId id="263" r:id="rId5"/>
+    <p:sldId id="258" r:id="rId6"/>
+    <p:sldId id="264" r:id="rId7"/>
     <p:sldId id="261" r:id="rId8"/>
     <p:sldId id="262" r:id="rId9"/>
   </p:sldIdLst>
@@ -112,6 +112,30 @@
     </a:lvl9pPr>
   </p:defaultTextStyle>
   <p:extLst>
+    <p:ext uri="{521415D9-36F7-43E2-AB2F-B90AF26B5E84}">
+      <p14:sectionLst xmlns:p14="http://schemas.microsoft.com/office/powerpoint/2010/main">
+        <p14:section name="AB" id="{BF8C6D5D-37BC-4146-8247-A71178A5CF65}">
+          <p14:sldIdLst>
+            <p14:sldId id="256"/>
+            <p14:sldId id="257"/>
+            <p14:sldId id="260"/>
+          </p14:sldIdLst>
+        </p14:section>
+        <p14:section name="JP" id="{E49CD601-F660-4164-982B-B2638B3289CF}">
+          <p14:sldIdLst>
+            <p14:sldId id="263"/>
+            <p14:sldId id="258"/>
+            <p14:sldId id="264"/>
+          </p14:sldIdLst>
+        </p14:section>
+        <p14:section name="AS" id="{80237F85-669F-4F28-9AD5-6518DB5032C0}">
+          <p14:sldIdLst>
+            <p14:sldId id="261"/>
+            <p14:sldId id="262"/>
+          </p14:sldIdLst>
+        </p14:section>
+      </p14:sectionLst>
+    </p:ext>
     <p:ext uri="{EFAFB233-063F-42B5-8137-9DF3F51BA10A}">
       <p15:sldGuideLst xmlns:p15="http://schemas.microsoft.com/office/powerpoint/2012/main"/>
     </p:ext>
@@ -10251,6 +10275,94 @@
 <file path=ppt/slides/slide4.xml><?xml version="1.0" encoding="utf-8"?>
 <p:sld xmlns:a="http://schemas.openxmlformats.org/drawingml/2006/main" xmlns:r="http://schemas.openxmlformats.org/officeDocument/2006/relationships" xmlns:p="http://schemas.openxmlformats.org/presentationml/2006/main">
   <p:cSld>
+    <p:spTree>
+      <p:nvGrpSpPr>
+        <p:cNvPr id="1" name=""/>
+        <p:cNvGrpSpPr/>
+        <p:nvPr/>
+      </p:nvGrpSpPr>
+      <p:grpSpPr>
+        <a:xfrm>
+          <a:off x="0" y="0"/>
+          <a:ext cx="0" cy="0"/>
+          <a:chOff x="0" y="0"/>
+          <a:chExt cx="0" cy="0"/>
+        </a:xfrm>
+      </p:grpSpPr>
+      <p:sp>
+        <p:nvSpPr>
+          <p:cNvPr id="2" name="Titel 1">
+            <a:extLst>
+              <a:ext uri="{FF2B5EF4-FFF2-40B4-BE49-F238E27FC236}">
+                <a16:creationId xmlns:a16="http://schemas.microsoft.com/office/drawing/2014/main" id="{80D39530-DEAD-4420-805E-7CF089CF39AD}"/>
+              </a:ext>
+            </a:extLst>
+          </p:cNvPr>
+          <p:cNvSpPr>
+            <a:spLocks noGrp="1"/>
+          </p:cNvSpPr>
+          <p:nvPr>
+            <p:ph type="title"/>
+          </p:nvPr>
+        </p:nvSpPr>
+        <p:spPr/>
+        <p:txBody>
+          <a:bodyPr/>
+          <a:lstStyle/>
+          <a:p>
+            <a:r>
+              <a:rPr lang="de-AT" dirty="0"/>
+              <a:t>Verwendete Technologien	</a:t>
+            </a:r>
+          </a:p>
+        </p:txBody>
+      </p:sp>
+      <p:pic>
+        <p:nvPicPr>
+          <p:cNvPr id="13" name="Grafik 12">
+            <a:extLst>
+              <a:ext uri="{FF2B5EF4-FFF2-40B4-BE49-F238E27FC236}">
+                <a16:creationId xmlns:a16="http://schemas.microsoft.com/office/drawing/2014/main" id="{2D49C344-62AE-4B0B-8CCC-19A75B8F5A40}"/>
+              </a:ext>
+            </a:extLst>
+          </p:cNvPr>
+          <p:cNvPicPr>
+            <a:picLocks noChangeAspect="1"/>
+          </p:cNvPicPr>
+          <p:nvPr/>
+        </p:nvPicPr>
+        <p:blipFill>
+          <a:blip r:embed="rId2"/>
+          <a:stretch>
+            <a:fillRect/>
+          </a:stretch>
+        </p:blipFill>
+        <p:spPr>
+          <a:xfrm>
+            <a:off x="2290231" y="2357288"/>
+            <a:ext cx="7611537" cy="2143424"/>
+          </a:xfrm>
+          <a:prstGeom prst="rect">
+            <a:avLst/>
+          </a:prstGeom>
+        </p:spPr>
+      </p:pic>
+    </p:spTree>
+    <p:extLst>
+      <p:ext uri="{BB962C8B-B14F-4D97-AF65-F5344CB8AC3E}">
+        <p14:creationId xmlns:p14="http://schemas.microsoft.com/office/powerpoint/2010/main" val="2601316560"/>
+      </p:ext>
+    </p:extLst>
+  </p:cSld>
+  <p:clrMapOvr>
+    <a:masterClrMapping/>
+  </p:clrMapOvr>
+</p:sld>
+</file>
+
+<file path=ppt/slides/slide5.xml><?xml version="1.0" encoding="utf-8"?>
+<p:sld xmlns:a="http://schemas.openxmlformats.org/drawingml/2006/main" xmlns:r="http://schemas.openxmlformats.org/officeDocument/2006/relationships" xmlns:p="http://schemas.openxmlformats.org/presentationml/2006/main">
+  <p:cSld>
     <p:bg>
       <p:bgPr>
         <a:solidFill>
@@ -10726,7 +10838,7 @@
 </p:sld>
 </file>
 
-<file path=ppt/slides/slide5.xml><?xml version="1.0" encoding="utf-8"?>
+<file path=ppt/slides/slide6.xml><?xml version="1.0" encoding="utf-8"?>
 <p:sld xmlns:a="http://schemas.openxmlformats.org/drawingml/2006/main" xmlns:r="http://schemas.openxmlformats.org/officeDocument/2006/relationships" xmlns:p="http://schemas.openxmlformats.org/presentationml/2006/main">
   <p:cSld>
     <p:spTree>
@@ -10827,94 +10939,6 @@
     <p:extLst>
       <p:ext uri="{BB962C8B-B14F-4D97-AF65-F5344CB8AC3E}">
         <p14:creationId xmlns:p14="http://schemas.microsoft.com/office/powerpoint/2010/main" val="4081641513"/>
-      </p:ext>
-    </p:extLst>
-  </p:cSld>
-  <p:clrMapOvr>
-    <a:masterClrMapping/>
-  </p:clrMapOvr>
-</p:sld>
-</file>
-
-<file path=ppt/slides/slide6.xml><?xml version="1.0" encoding="utf-8"?>
-<p:sld xmlns:a="http://schemas.openxmlformats.org/drawingml/2006/main" xmlns:r="http://schemas.openxmlformats.org/officeDocument/2006/relationships" xmlns:p="http://schemas.openxmlformats.org/presentationml/2006/main">
-  <p:cSld>
-    <p:spTree>
-      <p:nvGrpSpPr>
-        <p:cNvPr id="1" name=""/>
-        <p:cNvGrpSpPr/>
-        <p:nvPr/>
-      </p:nvGrpSpPr>
-      <p:grpSpPr>
-        <a:xfrm>
-          <a:off x="0" y="0"/>
-          <a:ext cx="0" cy="0"/>
-          <a:chOff x="0" y="0"/>
-          <a:chExt cx="0" cy="0"/>
-        </a:xfrm>
-      </p:grpSpPr>
-      <p:sp>
-        <p:nvSpPr>
-          <p:cNvPr id="2" name="Titel 1">
-            <a:extLst>
-              <a:ext uri="{FF2B5EF4-FFF2-40B4-BE49-F238E27FC236}">
-                <a16:creationId xmlns:a16="http://schemas.microsoft.com/office/drawing/2014/main" id="{80D39530-DEAD-4420-805E-7CF089CF39AD}"/>
-              </a:ext>
-            </a:extLst>
-          </p:cNvPr>
-          <p:cNvSpPr>
-            <a:spLocks noGrp="1"/>
-          </p:cNvSpPr>
-          <p:nvPr>
-            <p:ph type="title"/>
-          </p:nvPr>
-        </p:nvSpPr>
-        <p:spPr/>
-        <p:txBody>
-          <a:bodyPr/>
-          <a:lstStyle/>
-          <a:p>
-            <a:r>
-              <a:rPr lang="de-AT" dirty="0"/>
-              <a:t>Verwendete Technologien	</a:t>
-            </a:r>
-          </a:p>
-        </p:txBody>
-      </p:sp>
-      <p:pic>
-        <p:nvPicPr>
-          <p:cNvPr id="13" name="Grafik 12">
-            <a:extLst>
-              <a:ext uri="{FF2B5EF4-FFF2-40B4-BE49-F238E27FC236}">
-                <a16:creationId xmlns:a16="http://schemas.microsoft.com/office/drawing/2014/main" id="{2D49C344-62AE-4B0B-8CCC-19A75B8F5A40}"/>
-              </a:ext>
-            </a:extLst>
-          </p:cNvPr>
-          <p:cNvPicPr>
-            <a:picLocks noChangeAspect="1"/>
-          </p:cNvPicPr>
-          <p:nvPr/>
-        </p:nvPicPr>
-        <p:blipFill>
-          <a:blip r:embed="rId2"/>
-          <a:stretch>
-            <a:fillRect/>
-          </a:stretch>
-        </p:blipFill>
-        <p:spPr>
-          <a:xfrm>
-            <a:off x="2290231" y="2357288"/>
-            <a:ext cx="7611537" cy="2143424"/>
-          </a:xfrm>
-          <a:prstGeom prst="rect">
-            <a:avLst/>
-          </a:prstGeom>
-        </p:spPr>
-      </p:pic>
-    </p:spTree>
-    <p:extLst>
-      <p:ext uri="{BB962C8B-B14F-4D97-AF65-F5344CB8AC3E}">
-        <p14:creationId xmlns:p14="http://schemas.microsoft.com/office/powerpoint/2010/main" val="2601316560"/>
       </p:ext>
     </p:extLst>
   </p:cSld>

</xml_diff>